<commit_message>
plots and ligand 2
</commit_message>
<xml_diff>
--- a/plots/rmsd/rmsd_ligand_2.pptx
+++ b/plots/rmsd/rmsd_ligand_2.pptx
@@ -107,12 +107,12 @@
   <p:extLst>
     <p:ext uri="{EFAFB233-063F-42B5-8137-9DF3F51BA10A}">
       <p15:sldGuideLst xmlns:p15="http://schemas.microsoft.com/office/powerpoint/2012/main">
-        <p15:guide id="1" orient="horz" pos="459" userDrawn="1">
+        <p15:guide id="1" orient="horz" pos="3362" userDrawn="1">
           <p15:clr>
             <a:srgbClr val="A4A3A4"/>
           </p15:clr>
         </p15:guide>
-        <p15:guide id="2" pos="3545" userDrawn="1">
+        <p15:guide id="2" pos="4089" userDrawn="1">
           <p15:clr>
             <a:srgbClr val="A4A3A4"/>
           </p15:clr>
@@ -3339,39 +3339,10 @@
       </p:grpSpPr>
       <p:pic>
         <p:nvPicPr>
-          <p:cNvPr id="22" name="Picture 21">
-            <a:extLst>
-              <a:ext uri="{FF2B5EF4-FFF2-40B4-BE49-F238E27FC236}">
-                <a16:creationId xmlns:a16="http://schemas.microsoft.com/office/drawing/2014/main" id="{70DA3768-32FF-C08E-6B5E-A30D42A91AC5}"/>
-              </a:ext>
-            </a:extLst>
-          </p:cNvPr>
-          <p:cNvPicPr>
-            <a:picLocks noChangeAspect="1"/>
-          </p:cNvPicPr>
-          <p:nvPr/>
-        </p:nvPicPr>
-        <p:blipFill rotWithShape="1">
-          <a:blip r:embed="rId2"/>
-          <a:srcRect t="6860"/>
-          <a:stretch/>
-        </p:blipFill>
-        <p:spPr>
-          <a:xfrm>
-            <a:off x="0" y="713920"/>
-            <a:ext cx="5819116" cy="5419915"/>
-          </a:xfrm>
-          <a:prstGeom prst="rect">
-            <a:avLst/>
-          </a:prstGeom>
-        </p:spPr>
-      </p:pic>
-      <p:pic>
-        <p:nvPicPr>
-          <p:cNvPr id="23" name="Picture 22">
-            <a:extLst>
-              <a:ext uri="{FF2B5EF4-FFF2-40B4-BE49-F238E27FC236}">
-                <a16:creationId xmlns:a16="http://schemas.microsoft.com/office/drawing/2014/main" id="{E0F797B4-4F0F-7D8F-BADF-3BC9F5712B4C}"/>
+          <p:cNvPr id="10" name="Picture 9">
+            <a:extLst>
+              <a:ext uri="{FF2B5EF4-FFF2-40B4-BE49-F238E27FC236}">
+                <a16:creationId xmlns:a16="http://schemas.microsoft.com/office/drawing/2014/main" id="{C74C70B0-4AA4-E0EE-04A8-E4F2486A25F5}"/>
               </a:ext>
             </a:extLst>
           </p:cNvPr>
@@ -3388,8 +3359,8 @@
         </p:blipFill>
         <p:spPr>
           <a:xfrm>
-            <a:off x="5501399" y="314720"/>
-            <a:ext cx="5819116" cy="5819116"/>
+            <a:off x="6096000" y="724164"/>
+            <a:ext cx="5393946" cy="5393946"/>
           </a:xfrm>
           <a:prstGeom prst="rect">
             <a:avLst/>
@@ -3398,10 +3369,10 @@
       </p:pic>
       <p:pic>
         <p:nvPicPr>
-          <p:cNvPr id="20" name="Picture 19">
-            <a:extLst>
-              <a:ext uri="{FF2B5EF4-FFF2-40B4-BE49-F238E27FC236}">
-                <a16:creationId xmlns:a16="http://schemas.microsoft.com/office/drawing/2014/main" id="{1AEAB007-2A62-87FE-646F-D462E11ABAD2}"/>
+          <p:cNvPr id="14" name="Picture 13">
+            <a:extLst>
+              <a:ext uri="{FF2B5EF4-FFF2-40B4-BE49-F238E27FC236}">
+                <a16:creationId xmlns:a16="http://schemas.microsoft.com/office/drawing/2014/main" id="{9A63C23D-B34A-DF87-F2F5-8D35C02A92FB}"/>
               </a:ext>
             </a:extLst>
           </p:cNvPr>
@@ -3412,19 +3383,49 @@
         </p:nvPicPr>
         <p:blipFill rotWithShape="1">
           <a:blip r:embed="rId3"/>
-          <a:srcRect l="4125"/>
+          <a:srcRect l="4080"/>
           <a:stretch/>
         </p:blipFill>
         <p:spPr>
           <a:xfrm>
-            <a:off x="6037411" y="210019"/>
-            <a:ext cx="5579049" cy="5819116"/>
+            <a:off x="6621056" y="624047"/>
+            <a:ext cx="5173861" cy="5393946"/>
           </a:xfrm>
           <a:prstGeom prst="rect">
             <a:avLst/>
           </a:prstGeom>
         </p:spPr>
       </p:pic>
+      <p:pic>
+        <p:nvPicPr>
+          <p:cNvPr id="15" name="Picture 14">
+            <a:extLst>
+              <a:ext uri="{FF2B5EF4-FFF2-40B4-BE49-F238E27FC236}">
+                <a16:creationId xmlns:a16="http://schemas.microsoft.com/office/drawing/2014/main" id="{611D3EA8-6FCF-14ED-1320-47EA61CAC0E5}"/>
+              </a:ext>
+            </a:extLst>
+          </p:cNvPr>
+          <p:cNvPicPr>
+            <a:picLocks noChangeAspect="1"/>
+          </p:cNvPicPr>
+          <p:nvPr/>
+        </p:nvPicPr>
+        <p:blipFill>
+          <a:blip r:embed="rId2"/>
+          <a:stretch>
+            <a:fillRect/>
+          </a:stretch>
+        </p:blipFill>
+        <p:spPr>
+          <a:xfrm>
+            <a:off x="496390" y="724164"/>
+            <a:ext cx="5393946" cy="5393946"/>
+          </a:xfrm>
+          <a:prstGeom prst="rect">
+            <a:avLst/>
+          </a:prstGeom>
+        </p:spPr>
+      </p:pic>
       <p:sp>
         <p:nvSpPr>
           <p:cNvPr id="12" name="TextBox 11">
@@ -3439,7 +3440,7 @@
         </p:nvSpPr>
         <p:spPr>
           <a:xfrm>
-            <a:off x="8348" y="712569"/>
+            <a:off x="790142" y="724164"/>
             <a:ext cx="385042" cy="523220"/>
           </a:xfrm>
           <a:prstGeom prst="rect">
@@ -3476,7 +3477,7 @@
         </p:nvSpPr>
         <p:spPr>
           <a:xfrm>
-            <a:off x="5671848" y="724164"/>
+            <a:off x="6301665" y="729242"/>
             <a:ext cx="404278" cy="523220"/>
           </a:xfrm>
           <a:prstGeom prst="rect">

</xml_diff>